<commit_message>
Adicionando nodejs e suas dependencias, fazendo conexão com o banco mysql e adicionando sistema de login e loggof
</commit_message>
<xml_diff>
--- a/Prototipação de Dashboard/Prototipação Dashboard-EX2.pptx
+++ b/Prototipação de Dashboard/Prototipação Dashboard-EX2.pptx
@@ -110,7 +110,41 @@
       </a:defRPr>
     </a:lvl9pPr>
   </p:defaultTextStyle>
+  <p:extLst>
+    <p:ext uri="{EFAFB233-063F-42B5-8137-9DF3F51BA10A}">
+      <p15:sldGuideLst xmlns:p15="http://schemas.microsoft.com/office/powerpoint/2012/main"/>
+    </p:ext>
+  </p:extLst>
 </p:presentation>
+</file>
+
+<file path=ppt/changesInfos/changesInfo1.xml><?xml version="1.0" encoding="utf-8"?>
+<pc:chgInfo xmlns:a="http://schemas.openxmlformats.org/drawingml/2006/main" xmlns:r="http://schemas.openxmlformats.org/officeDocument/2006/relationships" xmlns:ac="http://schemas.microsoft.com/office/drawing/2013/main/command" xmlns:pc="http://schemas.microsoft.com/office/powerpoint/2013/main/command">
+  <pc:docChgLst>
+    <pc:chgData name="cesar" userId="10cb0cc1dc347670" providerId="LiveId" clId="{9D11611E-2066-46E6-B59A-B4A31966A554}"/>
+    <pc:docChg chg="modSld">
+      <pc:chgData name="cesar" userId="10cb0cc1dc347670" providerId="LiveId" clId="{9D11611E-2066-46E6-B59A-B4A31966A554}" dt="2020-11-16T23:06:10.778" v="0" actId="1076"/>
+      <pc:docMkLst>
+        <pc:docMk/>
+      </pc:docMkLst>
+      <pc:sldChg chg="modSp mod">
+        <pc:chgData name="cesar" userId="10cb0cc1dc347670" providerId="LiveId" clId="{9D11611E-2066-46E6-B59A-B4A31966A554}" dt="2020-11-16T23:06:10.778" v="0" actId="1076"/>
+        <pc:sldMkLst>
+          <pc:docMk/>
+          <pc:sldMk cId="2855491589" sldId="261"/>
+        </pc:sldMkLst>
+        <pc:spChg chg="mod">
+          <ac:chgData name="cesar" userId="10cb0cc1dc347670" providerId="LiveId" clId="{9D11611E-2066-46E6-B59A-B4A31966A554}" dt="2020-11-16T23:06:10.778" v="0" actId="1076"/>
+          <ac:spMkLst>
+            <pc:docMk/>
+            <pc:sldMk cId="2855491589" sldId="261"/>
+            <ac:spMk id="3" creationId="{67C6C400-24F4-4A5C-A667-CDED06E3EA6E}"/>
+          </ac:spMkLst>
+        </pc:spChg>
+      </pc:sldChg>
+    </pc:docChg>
+  </pc:docChgLst>
+</pc:chgInfo>
 </file>
 
 <file path=ppt/charts/chart1.xml><?xml version="1.0" encoding="utf-8"?>
@@ -11739,7 +11773,7 @@
         </p:nvSpPr>
         <p:spPr>
           <a:xfrm>
-            <a:off x="2226971" y="1584100"/>
+            <a:off x="2156113" y="1727705"/>
             <a:ext cx="2543758" cy="461665"/>
           </a:xfrm>
           <a:prstGeom prst="rect">

</xml_diff>

<commit_message>
Atualização de nova prototipação para o dash
</commit_message>
<xml_diff>
--- a/Prototipação de Dashboard/Prototipação Dashboard-EX2.pptx
+++ b/Prototipação de Dashboard/Prototipação Dashboard-EX2.pptx
@@ -1978,7 +1978,7 @@
           <a:p>
             <a:fld id="{F3E63C4A-BF98-4CC9-8356-54361AE5D5F6}" type="datetimeFigureOut">
               <a:rPr lang="pt-BR" smtClean="0"/>
-              <a:t>16/11/2020</a:t>
+              <a:t>20/11/2020</a:t>
             </a:fld>
             <a:endParaRPr lang="pt-BR"/>
           </a:p>
@@ -2176,7 +2176,7 @@
           <a:p>
             <a:fld id="{F3E63C4A-BF98-4CC9-8356-54361AE5D5F6}" type="datetimeFigureOut">
               <a:rPr lang="pt-BR" smtClean="0"/>
-              <a:t>16/11/2020</a:t>
+              <a:t>20/11/2020</a:t>
             </a:fld>
             <a:endParaRPr lang="pt-BR"/>
           </a:p>
@@ -2384,7 +2384,7 @@
           <a:p>
             <a:fld id="{F3E63C4A-BF98-4CC9-8356-54361AE5D5F6}" type="datetimeFigureOut">
               <a:rPr lang="pt-BR" smtClean="0"/>
-              <a:t>16/11/2020</a:t>
+              <a:t>20/11/2020</a:t>
             </a:fld>
             <a:endParaRPr lang="pt-BR"/>
           </a:p>
@@ -2582,7 +2582,7 @@
           <a:p>
             <a:fld id="{F3E63C4A-BF98-4CC9-8356-54361AE5D5F6}" type="datetimeFigureOut">
               <a:rPr lang="pt-BR" smtClean="0"/>
-              <a:t>16/11/2020</a:t>
+              <a:t>20/11/2020</a:t>
             </a:fld>
             <a:endParaRPr lang="pt-BR"/>
           </a:p>
@@ -2857,7 +2857,7 @@
           <a:p>
             <a:fld id="{F3E63C4A-BF98-4CC9-8356-54361AE5D5F6}" type="datetimeFigureOut">
               <a:rPr lang="pt-BR" smtClean="0"/>
-              <a:t>16/11/2020</a:t>
+              <a:t>20/11/2020</a:t>
             </a:fld>
             <a:endParaRPr lang="pt-BR"/>
           </a:p>
@@ -3122,7 +3122,7 @@
           <a:p>
             <a:fld id="{F3E63C4A-BF98-4CC9-8356-54361AE5D5F6}" type="datetimeFigureOut">
               <a:rPr lang="pt-BR" smtClean="0"/>
-              <a:t>16/11/2020</a:t>
+              <a:t>20/11/2020</a:t>
             </a:fld>
             <a:endParaRPr lang="pt-BR"/>
           </a:p>
@@ -3534,7 +3534,7 @@
           <a:p>
             <a:fld id="{F3E63C4A-BF98-4CC9-8356-54361AE5D5F6}" type="datetimeFigureOut">
               <a:rPr lang="pt-BR" smtClean="0"/>
-              <a:t>16/11/2020</a:t>
+              <a:t>20/11/2020</a:t>
             </a:fld>
             <a:endParaRPr lang="pt-BR"/>
           </a:p>
@@ -3675,7 +3675,7 @@
           <a:p>
             <a:fld id="{F3E63C4A-BF98-4CC9-8356-54361AE5D5F6}" type="datetimeFigureOut">
               <a:rPr lang="pt-BR" smtClean="0"/>
-              <a:t>16/11/2020</a:t>
+              <a:t>20/11/2020</a:t>
             </a:fld>
             <a:endParaRPr lang="pt-BR"/>
           </a:p>
@@ -3788,7 +3788,7 @@
           <a:p>
             <a:fld id="{F3E63C4A-BF98-4CC9-8356-54361AE5D5F6}" type="datetimeFigureOut">
               <a:rPr lang="pt-BR" smtClean="0"/>
-              <a:t>16/11/2020</a:t>
+              <a:t>20/11/2020</a:t>
             </a:fld>
             <a:endParaRPr lang="pt-BR"/>
           </a:p>
@@ -4099,7 +4099,7 @@
           <a:p>
             <a:fld id="{F3E63C4A-BF98-4CC9-8356-54361AE5D5F6}" type="datetimeFigureOut">
               <a:rPr lang="pt-BR" smtClean="0"/>
-              <a:t>16/11/2020</a:t>
+              <a:t>20/11/2020</a:t>
             </a:fld>
             <a:endParaRPr lang="pt-BR"/>
           </a:p>
@@ -4387,7 +4387,7 @@
           <a:p>
             <a:fld id="{F3E63C4A-BF98-4CC9-8356-54361AE5D5F6}" type="datetimeFigureOut">
               <a:rPr lang="pt-BR" smtClean="0"/>
-              <a:t>16/11/2020</a:t>
+              <a:t>20/11/2020</a:t>
             </a:fld>
             <a:endParaRPr lang="pt-BR"/>
           </a:p>
@@ -4628,7 +4628,7 @@
           <a:p>
             <a:fld id="{F3E63C4A-BF98-4CC9-8356-54361AE5D5F6}" type="datetimeFigureOut">
               <a:rPr lang="pt-BR" smtClean="0"/>
-              <a:t>16/11/2020</a:t>
+              <a:t>20/11/2020</a:t>
             </a:fld>
             <a:endParaRPr lang="pt-BR"/>
           </a:p>

</xml_diff>